<commit_message>
replace grid with CI
git-svn-id: file:///localdisk/subversion/inca/trunk/pubs@13427 7dba3f4a-8be6-0310-8b3b-b4fec25ea7f3
</commit_message>
<xml_diff>
--- a/pubs/talks/2010/2010workshop/overview.pptx
+++ b/pubs/talks/2010/2010workshop/overview.pptx
@@ -2963,7 +2963,7 @@
           <a:lstStyle/>
           <a:p>
             <a:pPr eaLnBrk="1" hangingPunct="1"/>
-            <a:endParaRPr lang="en-US">
+            <a:endParaRPr lang="en-US" dirty="0">
               <a:latin typeface="Arial" charset="0"/>
               <a:ea typeface="ＭＳ Ｐゴシック" charset="-128"/>
               <a:cs typeface="ＭＳ Ｐゴシック" charset="-128"/>
@@ -6237,9 +6237,14 @@
           <a:lstStyle/>
           <a:p>
             <a:r>
-              <a:rPr lang="en-US"/>
-              <a:t>Inca provides user-level grid monitoring</a:t>
-            </a:r>
+              <a:rPr lang="en-US" dirty="0"/>
+              <a:t>Inca provides user-level</a:t>
+            </a:r>
+            <a:r>
+              <a:rPr lang="en-US" dirty="0" smtClean="0"/>
+              <a:t> CI monitoring</a:t>
+            </a:r>
+            <a:endParaRPr lang="en-US" dirty="0"/>
           </a:p>
         </p:txBody>
       </p:sp>
@@ -6660,7 +6665,7 @@
               <a:buSzTx/>
             </a:pPr>
             <a:r>
-              <a:rPr lang="en-US" sz="2400"/>
+              <a:rPr lang="en-US" sz="2400" dirty="0"/>
               <a:t>Collection of reporters available via a URL</a:t>
             </a:r>
           </a:p>
@@ -6675,7 +6680,7 @@
               <a:buSzTx/>
             </a:pPr>
             <a:r>
-              <a:rPr lang="en-US" sz="2400"/>
+              <a:rPr lang="en-US" sz="2400" dirty="0"/>
               <a:t>Supports package dependencies</a:t>
             </a:r>
           </a:p>
@@ -6694,7 +6699,7 @@
               <a:buSzTx/>
             </a:pPr>
             <a:r>
-              <a:rPr lang="en-US" sz="2400"/>
+              <a:rPr lang="en-US" sz="2400" dirty="0"/>
               <a:t>Packages versioned to allow for automatic updates</a:t>
             </a:r>
           </a:p>
@@ -6710,7 +6715,7 @@
               <a:buSzTx/>
             </a:pPr>
             <a:r>
-              <a:rPr lang="en-US" sz="2400"/>
+              <a:rPr lang="en-US" sz="2400" dirty="0"/>
               <a:t>Inca project repository contains 150+ reporters</a:t>
             </a:r>
           </a:p>
@@ -6726,12 +6731,16 @@
               <a:buSzTx/>
             </a:pPr>
             <a:r>
-              <a:rPr lang="en-US" sz="2000">
+              <a:rPr lang="en-US" sz="2000" dirty="0">
                 <a:ea typeface="ＭＳ Ｐゴシック" charset="-128"/>
                 <a:cs typeface="ＭＳ Ｐゴシック" charset="-128"/>
               </a:rPr>
               <a:t>Version, unit test, performance benchmark reporters</a:t>
             </a:r>
+            <a:endParaRPr lang="en-US" sz="2000" dirty="0" smtClean="0">
+              <a:ea typeface="ＭＳ Ｐゴシック" charset="-128"/>
+              <a:cs typeface="ＭＳ Ｐゴシック" charset="-128"/>
+            </a:endParaRPr>
           </a:p>
           <a:p>
             <a:pPr lvl="1">
@@ -6745,13 +6754,34 @@
               <a:buSzTx/>
             </a:pPr>
             <a:r>
-              <a:rPr lang="en-US" sz="2000">
+              <a:rPr lang="en-US" sz="2000" dirty="0" smtClean="0">
                 <a:ea typeface="ＭＳ Ｐゴシック" charset="-128"/>
                 <a:cs typeface="ＭＳ Ｐゴシック" charset="-128"/>
               </a:rPr>
-              <a:t>Grid middleware and tools, compilers, math libraries, data tools, and viz tool</a:t>
-            </a:r>
-            <a:endParaRPr lang="en-US" sz="2000">
+              <a:t>CI </a:t>
+            </a:r>
+            <a:r>
+              <a:rPr lang="en-US" sz="2000" dirty="0">
+                <a:ea typeface="ＭＳ Ｐゴシック" charset="-128"/>
+                <a:cs typeface="ＭＳ Ｐゴシック" charset="-128"/>
+              </a:rPr>
+              <a:t>middleware and tools, compilers, math libraries, data tools, and </a:t>
+            </a:r>
+            <a:r>
+              <a:rPr lang="en-US" sz="2000" dirty="0" err="1">
+                <a:ea typeface="ＭＳ Ｐゴシック" charset="-128"/>
+                <a:cs typeface="ＭＳ Ｐゴシック" charset="-128"/>
+              </a:rPr>
+              <a:t>viz</a:t>
+            </a:r>
+            <a:r>
+              <a:rPr lang="en-US" sz="2000" dirty="0">
+                <a:ea typeface="ＭＳ Ｐゴシック" charset="-128"/>
+                <a:cs typeface="ＭＳ Ｐゴシック" charset="-128"/>
+              </a:rPr>
+              <a:t> tool</a:t>
+            </a:r>
+            <a:endParaRPr lang="en-US" sz="2000" dirty="0">
               <a:ea typeface="ＭＳ Ｐゴシック" charset="-128"/>
             </a:endParaRPr>
           </a:p>
@@ -10890,8 +10920,16 @@
           <a:lstStyle/>
           <a:p>
             <a:r>
-              <a:rPr lang="en-US"/>
-              <a:t>Inca TeraGrid deployment</a:t>
+              <a:rPr lang="en-US" dirty="0"/>
+              <a:t>Inca </a:t>
+            </a:r>
+            <a:r>
+              <a:rPr lang="en-US" dirty="0" err="1"/>
+              <a:t>TeraGrid</a:t>
+            </a:r>
+            <a:r>
+              <a:rPr lang="en-US" dirty="0"/>
+              <a:t> deployment</a:t>
             </a:r>
           </a:p>
         </p:txBody>
@@ -10925,7 +10963,7 @@
               </a:spcAft>
             </a:pPr>
             <a:r>
-              <a:rPr lang="en-US" sz="2000"/>
+              <a:rPr lang="en-US" sz="2000" dirty="0"/>
               <a:t>Running since 2003</a:t>
             </a:r>
           </a:p>
@@ -10939,7 +10977,7 @@
               </a:spcAft>
             </a:pPr>
             <a:r>
-              <a:rPr lang="en-US" sz="2000"/>
+              <a:rPr lang="en-US" sz="2000" dirty="0"/>
               <a:t>Total of 2660 tests running on 20 login nodes, 3 grid nodes, and 3 servers</a:t>
             </a:r>
           </a:p>
@@ -10953,7 +10991,7 @@
               </a:spcAft>
             </a:pPr>
             <a:r>
-              <a:rPr lang="en-US" sz="2000"/>
+              <a:rPr lang="en-US" sz="2000" dirty="0"/>
               <a:t>Coordinated software and services</a:t>
             </a:r>
           </a:p>
@@ -10967,7 +11005,7 @@
               </a:spcAft>
             </a:pPr>
             <a:r>
-              <a:rPr lang="en-US" sz="2000"/>
+              <a:rPr lang="en-US" sz="2000" dirty="0"/>
               <a:t>Cross-site tests</a:t>
             </a:r>
           </a:p>
@@ -10981,7 +11019,7 @@
               </a:spcAft>
             </a:pPr>
             <a:r>
-              <a:rPr lang="en-US" sz="2000"/>
+              <a:rPr lang="en-US" sz="2000" dirty="0"/>
               <a:t>GRAM usage</a:t>
             </a:r>
           </a:p>
@@ -10995,7 +11033,7 @@
               </a:spcAft>
             </a:pPr>
             <a:r>
-              <a:rPr lang="en-US" sz="2000"/>
+              <a:rPr lang="en-US" sz="2000" dirty="0"/>
               <a:t>CA certificate and CRL checking</a:t>
             </a:r>
           </a:p>
@@ -11009,10 +11047,10 @@
               </a:spcAft>
             </a:pPr>
             <a:r>
-              <a:rPr lang="en-US" sz="2000"/>
+              <a:rPr lang="en-US" sz="2000" dirty="0"/>
               <a:t>Resource registration in information services</a:t>
             </a:r>
-            <a:endParaRPr lang="en-US" sz="1600"/>
+            <a:endParaRPr lang="en-US" sz="1600" dirty="0"/>
           </a:p>
         </p:txBody>
       </p:sp>
@@ -11124,15 +11162,24 @@
           <a:lstStyle/>
           <a:p>
             <a:r>
-              <a:rPr lang="en-US" sz="1800">
+              <a:rPr lang="en-US" sz="1800" dirty="0">
                 <a:solidFill>
                   <a:schemeClr val="accent2"/>
                 </a:solidFill>
                 <a:latin typeface="Times New Roman" charset="0"/>
               </a:rPr>
-              <a:t>Screenshot of Inca status pages for TeraGrid</a:t>
-            </a:r>
-            <a:endParaRPr lang="en-US" sz="2400">
+              <a:t>Screenshot of Inca status pages for </a:t>
+            </a:r>
+            <a:r>
+              <a:rPr lang="en-US" sz="1800" dirty="0" err="1">
+                <a:solidFill>
+                  <a:schemeClr val="accent2"/>
+                </a:solidFill>
+                <a:latin typeface="Times New Roman" charset="0"/>
+              </a:rPr>
+              <a:t>TeraGrid</a:t>
+            </a:r>
+            <a:endParaRPr lang="en-US" sz="2400" dirty="0">
               <a:latin typeface="Times New Roman" charset="0"/>
             </a:endParaRPr>
           </a:p>
@@ -11173,10 +11220,22 @@
           <a:p>
             <a:pPr algn="ctr"/>
             <a:r>
-              <a:rPr lang="en-US">
+              <a:rPr lang="en-US" dirty="0">
                 <a:latin typeface="Times New Roman" charset="0"/>
               </a:rPr>
-              <a:t>http://inca.teragrid.org/</a:t>
+              <a:t>http://</a:t>
+            </a:r>
+            <a:r>
+              <a:rPr lang="en-US" dirty="0" err="1">
+                <a:latin typeface="Times New Roman" charset="0"/>
+              </a:rPr>
+              <a:t>inca.teragrid.org</a:t>
+            </a:r>
+            <a:r>
+              <a:rPr lang="en-US" dirty="0">
+                <a:latin typeface="Times New Roman" charset="0"/>
+              </a:rPr>
+              <a:t>/</a:t>
             </a:r>
           </a:p>
         </p:txBody>
@@ -11256,25 +11315,30 @@
           <a:lstStyle/>
           <a:p>
             <a:r>
-              <a:rPr lang="en-US"/>
+              <a:rPr lang="en-US" dirty="0"/>
               <a:t>Introduce features and benefits of Inca to new or interested users.</a:t>
             </a:r>
           </a:p>
           <a:p>
-            <a:endParaRPr lang="en-US"/>
-          </a:p>
-          <a:p>
-            <a:r>
-              <a:rPr lang="en-US"/>
-              <a:t>Help existing users to better utilize Inca for their Grid.</a:t>
-            </a:r>
-          </a:p>
-          <a:p>
-            <a:endParaRPr lang="en-US"/>
-          </a:p>
-          <a:p>
-            <a:r>
-              <a:rPr lang="en-US"/>
+            <a:endParaRPr lang="en-US" dirty="0"/>
+          </a:p>
+          <a:p>
+            <a:r>
+              <a:rPr lang="en-US" dirty="0"/>
+              <a:t>Help existing users to better utilize Inca for their</a:t>
+            </a:r>
+            <a:r>
+              <a:rPr lang="en-US" dirty="0" smtClean="0"/>
+              <a:t> CI systems.</a:t>
+            </a:r>
+            <a:endParaRPr lang="en-US" dirty="0"/>
+          </a:p>
+          <a:p>
+            <a:endParaRPr lang="en-US" dirty="0"/>
+          </a:p>
+          <a:p>
+            <a:r>
+              <a:rPr lang="en-US" dirty="0"/>
               <a:t>Gather any feedback on new features, improvements to features, etc.</a:t>
             </a:r>
           </a:p>
@@ -11333,10 +11397,18 @@
           <a:lstStyle/>
           <a:p>
             <a:r>
-              <a:rPr lang="en-US" sz="3200"/>
-              <a:t>Inca monitoring benefits TeraGrid end users</a:t>
-            </a:r>
-            <a:endParaRPr lang="en-US"/>
+              <a:rPr lang="en-US" sz="3200" dirty="0"/>
+              <a:t>Inca monitoring benefits </a:t>
+            </a:r>
+            <a:r>
+              <a:rPr lang="en-US" sz="3200" dirty="0" err="1"/>
+              <a:t>TeraGrid</a:t>
+            </a:r>
+            <a:r>
+              <a:rPr lang="en-US" sz="3200" dirty="0"/>
+              <a:t> end users</a:t>
+            </a:r>
+            <a:endParaRPr lang="en-US" dirty="0"/>
           </a:p>
         </p:txBody>
       </p:sp>
@@ -11521,24 +11593,42 @@
           <a:p>
             <a:pPr algn="ctr"/>
             <a:r>
-              <a:rPr lang="en-US" sz="1600">
+              <a:rPr lang="en-US" sz="1600" dirty="0">
                 <a:latin typeface="Times New Roman" charset="0"/>
               </a:rPr>
               <a:t>“</a:t>
             </a:r>
             <a:r>
-              <a:rPr lang="en-US" sz="1600">
+              <a:rPr lang="en-US" sz="1600" dirty="0">
                 <a:solidFill>
                   <a:srgbClr val="000000"/>
                 </a:solidFill>
                 <a:latin typeface="Times New Roman" charset="0"/>
               </a:rPr>
-              <a:t>Inca reported errors mirror failures we’ve observed and as they are addressed we’ve noticed an improvement in TeraGrid’s stability.”</a:t>
+              <a:t>Inca reported errors mirror failures we’ve observed and as they are addressed we’ve noticed an improvement in </a:t>
+            </a:r>
+            <a:r>
+              <a:rPr lang="en-US" sz="1600" dirty="0" err="1">
+                <a:solidFill>
+                  <a:srgbClr val="000000"/>
+                </a:solidFill>
+                <a:latin typeface="Times New Roman" charset="0"/>
+              </a:rPr>
+              <a:t>TeraGrid’s</a:t>
+            </a:r>
+            <a:r>
+              <a:rPr lang="en-US" sz="1600" dirty="0">
+                <a:solidFill>
+                  <a:srgbClr val="000000"/>
+                </a:solidFill>
+                <a:latin typeface="Times New Roman" charset="0"/>
+              </a:rPr>
+              <a:t> stability.”</a:t>
             </a:r>
           </a:p>
           <a:p>
             <a:pPr algn="ctr"/>
-            <a:endParaRPr lang="en-US" sz="1600">
+            <a:endParaRPr lang="en-US" sz="1600" dirty="0">
               <a:solidFill>
                 <a:srgbClr val="000000"/>
               </a:solidFill>
@@ -11548,15 +11638,33 @@
           <a:p>
             <a:pPr algn="ctr"/>
             <a:r>
-              <a:rPr lang="en-US" sz="1600">
+              <a:rPr lang="en-US" sz="1600" dirty="0">
                 <a:solidFill>
                   <a:srgbClr val="000000"/>
                 </a:solidFill>
                 <a:latin typeface="Times New Roman" charset="0"/>
               </a:rPr>
-              <a:t>-- Suresh Marru (LEAD developer)</a:t>
-            </a:r>
-            <a:endParaRPr lang="en-US" sz="2400">
+              <a:t>-- Suresh </a:t>
+            </a:r>
+            <a:r>
+              <a:rPr lang="en-US" sz="1600" dirty="0" err="1">
+                <a:solidFill>
+                  <a:srgbClr val="000000"/>
+                </a:solidFill>
+                <a:latin typeface="Times New Roman" charset="0"/>
+              </a:rPr>
+              <a:t>Marru</a:t>
+            </a:r>
+            <a:r>
+              <a:rPr lang="en-US" sz="1600" dirty="0">
+                <a:solidFill>
+                  <a:srgbClr val="000000"/>
+                </a:solidFill>
+                <a:latin typeface="Times New Roman" charset="0"/>
+              </a:rPr>
+              <a:t> (LEAD developer)</a:t>
+            </a:r>
+            <a:endParaRPr lang="en-US" sz="2400" dirty="0">
               <a:solidFill>
                 <a:srgbClr val="000000"/>
               </a:solidFill>
@@ -16492,13 +16600,31 @@
               <a:buChar char="•"/>
             </a:pPr>
             <a:r>
-              <a:rPr lang="en-US" sz="2400">
-                <a:latin typeface="Times New Roman" charset="0"/>
+              <a:rPr lang="en-US" sz="2400" dirty="0">
+                <a:latin typeface="+mj-lt"/>
               </a:rPr>
-              <a:t>Over 750 TF</a:t>
-            </a:r>
-            <a:endParaRPr lang="en-GB" sz="2400">
-              <a:latin typeface="Times New Roman" charset="0"/>
+              <a:t>Over</a:t>
+            </a:r>
+            <a:r>
+              <a:rPr lang="en-US" sz="2400" dirty="0" smtClean="0">
+                <a:latin typeface="+mj-lt"/>
+              </a:rPr>
+              <a:t> </a:t>
+            </a:r>
+            <a:r>
+              <a:rPr lang="en-US" sz="2400" dirty="0" smtClean="0">
+                <a:latin typeface="+mj-lt"/>
+              </a:rPr>
+              <a:t>2 </a:t>
+            </a:r>
+            <a:r>
+              <a:rPr lang="en-US" sz="2400" dirty="0" err="1" smtClean="0">
+                <a:latin typeface="+mj-lt"/>
+              </a:rPr>
+              <a:t>petaflops</a:t>
+            </a:r>
+            <a:endParaRPr lang="en-GB" sz="2400" dirty="0" smtClean="0">
+              <a:latin typeface="+mj-lt"/>
             </a:endParaRPr>
           </a:p>
           <a:p>
@@ -16510,10 +16636,22 @@
               <a:buChar char="•"/>
             </a:pPr>
             <a:r>
-              <a:rPr lang="en-US" sz="2400">
+              <a:rPr lang="en-US" sz="2400" dirty="0">
                 <a:latin typeface="Times New Roman" charset="0"/>
               </a:rPr>
-              <a:t>Over 30 PB of online and archival data storage</a:t>
+              <a:t>Over</a:t>
+            </a:r>
+            <a:r>
+              <a:rPr lang="en-US" sz="2400" dirty="0" smtClean="0">
+                <a:latin typeface="Times New Roman" charset="0"/>
+              </a:rPr>
+              <a:t> 50 </a:t>
+            </a:r>
+            <a:r>
+              <a:rPr lang="en-US" sz="2400" dirty="0">
+                <a:latin typeface="Times New Roman" charset="0"/>
+              </a:rPr>
+              <a:t>PB of online and archival data storage</a:t>
             </a:r>
           </a:p>
           <a:p>
@@ -16525,10 +16663,22 @@
               <a:buChar char="•"/>
             </a:pPr>
             <a:r>
-              <a:rPr lang="en-GB" sz="2400">
+              <a:rPr lang="en-GB" sz="2400" dirty="0">
                 <a:latin typeface="Times New Roman" charset="0"/>
               </a:rPr>
-              <a:t>Connected via dedicated multi-Gbps links</a:t>
+              <a:t>Connected via dedicated multi-</a:t>
+            </a:r>
+            <a:r>
+              <a:rPr lang="en-GB" sz="2400" dirty="0" err="1">
+                <a:latin typeface="Times New Roman" charset="0"/>
+              </a:rPr>
+              <a:t>Gbps</a:t>
+            </a:r>
+            <a:r>
+              <a:rPr lang="en-GB" sz="2400" dirty="0">
+                <a:latin typeface="Times New Roman" charset="0"/>
+              </a:rPr>
+              <a:t> links</a:t>
             </a:r>
           </a:p>
           <a:p>
@@ -16540,12 +16690,12 @@
               <a:buChar char="•"/>
             </a:pPr>
             <a:r>
-              <a:rPr lang="en-GB" sz="2400">
+              <a:rPr lang="en-GB" sz="2400" dirty="0">
                 <a:latin typeface="Times New Roman" charset="0"/>
               </a:rPr>
               <a:t>30-63 software packages and 6-23 services per resource</a:t>
             </a:r>
-            <a:endParaRPr lang="en-US" sz="2400">
+            <a:endParaRPr lang="en-US" sz="2400" dirty="0">
               <a:latin typeface="Times New Roman" charset="0"/>
             </a:endParaRPr>
           </a:p>
@@ -16572,14 +16722,46 @@
           <a:lstStyle/>
           <a:p>
             <a:r>
-              <a:rPr lang="en-GB" sz="3200">
+              <a:rPr lang="en-GB" sz="3200" dirty="0">
                 <a:solidFill>
                   <a:srgbClr val="0E1ECC"/>
                 </a:solidFill>
               </a:rPr>
-              <a:t>Goal: reliable grid software and services for users</a:t>
-            </a:r>
-            <a:endParaRPr lang="en-US"/>
+              <a:t>Goal: reliable</a:t>
+            </a:r>
+            <a:r>
+              <a:rPr lang="en-GB" sz="3200" dirty="0" smtClean="0">
+                <a:solidFill>
+                  <a:srgbClr val="0E1ECC"/>
+                </a:solidFill>
+              </a:rPr>
+              <a:t> </a:t>
+            </a:r>
+            <a:r>
+              <a:rPr lang="en-GB" sz="3200" dirty="0" err="1" smtClean="0">
+                <a:solidFill>
+                  <a:srgbClr val="0E1ECC"/>
+                </a:solidFill>
+              </a:rPr>
+              <a:t>cyberinfrastructure</a:t>
+            </a:r>
+            <a:r>
+              <a:rPr lang="en-GB" sz="3200" dirty="0" smtClean="0">
+                <a:solidFill>
+                  <a:srgbClr val="0E1ECC"/>
+                </a:solidFill>
+              </a:rPr>
+              <a:t> (CI) for </a:t>
+            </a:r>
+            <a:r>
+              <a:rPr lang="en-GB" sz="3200" dirty="0">
+                <a:solidFill>
+                  <a:srgbClr val="0E1ECC"/>
+                </a:solidFill>
+              </a:rPr>
+              <a:t>users</a:t>
+            </a:r>
+            <a:endParaRPr lang="en-US" dirty="0"/>
           </a:p>
         </p:txBody>
       </p:sp>
@@ -16626,7 +16808,7 @@
         <p:spPr bwMode="auto">
           <a:xfrm>
             <a:off x="3906838" y="4873625"/>
-            <a:ext cx="3408362" cy="396875"/>
+            <a:ext cx="3397601" cy="400110"/>
           </a:xfrm>
           <a:prstGeom prst="rect">
             <a:avLst/>
@@ -16673,7 +16855,43 @@
                 </a:solidFill>
                 <a:latin typeface="Times New Roman" charset="0"/>
               </a:rPr>
-              <a:t> sites, 21 resources</a:t>
+              <a:t> sites,</a:t>
+            </a:r>
+            <a:r>
+              <a:rPr lang="en-GB" i="1" dirty="0" smtClean="0">
+                <a:solidFill>
+                  <a:schemeClr val="accent2"/>
+                </a:solidFill>
+                <a:latin typeface="Times New Roman" charset="0"/>
+              </a:rPr>
+              <a:t> </a:t>
+            </a:r>
+            <a:r>
+              <a:rPr lang="en-GB" i="1" dirty="0" smtClean="0">
+                <a:solidFill>
+                  <a:schemeClr val="accent2"/>
+                </a:solidFill>
+                <a:latin typeface="Times New Roman" charset="0"/>
+              </a:rPr>
+              <a:t>12</a:t>
+            </a:r>
+            <a:r>
+              <a:rPr lang="en-GB" i="1" dirty="0" smtClean="0">
+                <a:solidFill>
+                  <a:schemeClr val="accent2"/>
+                </a:solidFill>
+                <a:latin typeface="Times New Roman" charset="0"/>
+              </a:rPr>
+              <a:t> </a:t>
+            </a:r>
+            <a:r>
+              <a:rPr lang="en-GB" i="1" dirty="0">
+                <a:solidFill>
+                  <a:schemeClr val="accent2"/>
+                </a:solidFill>
+                <a:latin typeface="Times New Roman" charset="0"/>
+              </a:rPr>
+              <a:t>resources</a:t>
             </a:r>
             <a:endParaRPr lang="en-US" sz="2400" dirty="0">
               <a:latin typeface="Times New Roman" charset="0"/>
@@ -16758,15 +16976,32 @@
               <a:buNone/>
             </a:pPr>
             <a:r>
-              <a:rPr lang="en-US">
+              <a:rPr lang="en-US" dirty="0">
                 <a:solidFill>
                   <a:schemeClr val="hlink"/>
                 </a:solidFill>
                 <a:latin typeface="Arial" charset="0"/>
                 <a:ea typeface="ＭＳ Ｐゴシック" charset="-128"/>
               </a:rPr>
-              <a:t>Inca’s primary objective:  user-level Grid monitoring</a:t>
-            </a:r>
+              <a:t>Inca’s primary objective:  user-level</a:t>
+            </a:r>
+            <a:r>
+              <a:rPr lang="en-US" dirty="0" smtClean="0">
+                <a:solidFill>
+                  <a:schemeClr val="hlink"/>
+                </a:solidFill>
+                <a:latin typeface="Arial" charset="0"/>
+                <a:ea typeface="ＭＳ Ｐゴシック" charset="-128"/>
+              </a:rPr>
+              <a:t> CI monitoring</a:t>
+            </a:r>
+            <a:endParaRPr lang="en-US" dirty="0">
+              <a:solidFill>
+                <a:schemeClr val="hlink"/>
+              </a:solidFill>
+              <a:latin typeface="Arial" charset="0"/>
+              <a:ea typeface="ＭＳ Ｐゴシック" charset="-128"/>
+            </a:endParaRPr>
           </a:p>
         </p:txBody>
       </p:sp>
@@ -16786,11 +17021,25 @@
           <a:lstStyle/>
           <a:p>
             <a:r>
-              <a:rPr lang="en-US">
+              <a:rPr lang="en-US" dirty="0">
                 <a:latin typeface="Arial" charset="0"/>
                 <a:ea typeface="ＭＳ Ｐゴシック" charset="-128"/>
               </a:rPr>
-              <a:t>Related Grid monitoring tools</a:t>
+              <a:t>Related</a:t>
+            </a:r>
+            <a:r>
+              <a:rPr lang="en-US" dirty="0" smtClean="0">
+                <a:latin typeface="Arial" charset="0"/>
+                <a:ea typeface="ＭＳ Ｐゴシック" charset="-128"/>
+              </a:rPr>
+              <a:t> CI monitoring </a:t>
+            </a:r>
+            <a:r>
+              <a:rPr lang="en-US" dirty="0">
+                <a:latin typeface="Arial" charset="0"/>
+                <a:ea typeface="ＭＳ Ｐゴシック" charset="-128"/>
+              </a:rPr>
+              <a:t>tools</a:t>
             </a:r>
           </a:p>
         </p:txBody>
@@ -17090,9 +17339,14 @@
           <a:lstStyle/>
           <a:p>
             <a:r>
-              <a:rPr lang="en-US"/>
-              <a:t>User-level grid monitoring</a:t>
-            </a:r>
+              <a:rPr lang="en-US" dirty="0"/>
+              <a:t>User-level</a:t>
+            </a:r>
+            <a:r>
+              <a:rPr lang="en-US" dirty="0" smtClean="0"/>
+              <a:t> CI monitoring</a:t>
+            </a:r>
+            <a:endParaRPr lang="en-US" dirty="0"/>
           </a:p>
         </p:txBody>
       </p:sp>
@@ -17128,7 +17382,7 @@
               </a:spcAft>
             </a:pPr>
             <a:r>
-              <a:rPr lang="en-US" sz="2400"/>
+              <a:rPr lang="en-US" sz="2400" dirty="0"/>
               <a:t>Runs from a standard user account</a:t>
             </a:r>
           </a:p>
@@ -17142,7 +17396,7 @@
               </a:spcAft>
             </a:pPr>
             <a:r>
-              <a:rPr lang="en-US" sz="2400"/>
+              <a:rPr lang="en-US" sz="2400" dirty="0"/>
               <a:t>Executes using a standard GSI credential</a:t>
             </a:r>
           </a:p>
@@ -17156,7 +17410,7 @@
               </a:spcAft>
             </a:pPr>
             <a:r>
-              <a:rPr lang="en-US" sz="2400"/>
+              <a:rPr lang="en-US" sz="2400" dirty="0"/>
               <a:t>Uses tests that are developed and configured based on user documentation</a:t>
             </a:r>
           </a:p>
@@ -17170,7 +17424,7 @@
               </a:spcAft>
             </a:pPr>
             <a:r>
-              <a:rPr lang="en-US" sz="2400"/>
+              <a:rPr lang="en-US" sz="2400" dirty="0"/>
               <a:t>Centrally manages monitoring configuration </a:t>
             </a:r>
           </a:p>
@@ -17184,7 +17438,7 @@
               </a:spcAft>
             </a:pPr>
             <a:r>
-              <a:rPr lang="en-US" sz="2400"/>
+              <a:rPr lang="en-US" sz="2400" dirty="0"/>
               <a:t>Automates periodic execution of tests</a:t>
             </a:r>
           </a:p>
@@ -17198,8 +17452,16 @@
               </a:spcAft>
             </a:pPr>
             <a:r>
-              <a:rPr lang="en-US" sz="2400"/>
-              <a:t>Verifies user-accessible Grid access points</a:t>
+              <a:rPr lang="en-US" sz="2400" dirty="0"/>
+              <a:t>Verifies user-accessible</a:t>
+            </a:r>
+            <a:r>
+              <a:rPr lang="en-US" sz="2400" dirty="0" smtClean="0"/>
+              <a:t> access </a:t>
+            </a:r>
+            <a:r>
+              <a:rPr lang="en-US" sz="2400" dirty="0"/>
+              <a:t>points</a:t>
             </a:r>
           </a:p>
           <a:p>
@@ -17212,7 +17474,7 @@
               </a:spcAft>
             </a:pPr>
             <a:r>
-              <a:rPr lang="en-US" sz="2400"/>
+              <a:rPr lang="en-US" sz="2400" dirty="0"/>
               <a:t>Easily updates and maintains monitoring deployment</a:t>
             </a:r>
           </a:p>
@@ -17537,10 +17799,18 @@
           <a:lstStyle/>
           <a:p>
             <a:r>
-              <a:rPr lang="en-US" sz="3200"/>
-              <a:t>Who benefits from user-level grid monitoring?</a:t>
-            </a:r>
-            <a:endParaRPr lang="en-US"/>
+              <a:rPr lang="en-US" sz="3200" dirty="0"/>
+              <a:t>Who benefits from user-level</a:t>
+            </a:r>
+            <a:r>
+              <a:rPr lang="en-US" sz="3200" dirty="0" smtClean="0"/>
+              <a:t> CI monitoring</a:t>
+            </a:r>
+            <a:r>
+              <a:rPr lang="en-US" sz="3200" dirty="0"/>
+              <a:t>?</a:t>
+            </a:r>
+            <a:endParaRPr lang="en-US" dirty="0"/>
           </a:p>
         </p:txBody>
       </p:sp>
@@ -17565,9 +17835,10 @@
           <a:lstStyle/>
           <a:p>
             <a:r>
-              <a:rPr lang="en-US" sz="2400"/>
-              <a:t>Grid operators</a:t>
-            </a:r>
+              <a:rPr lang="en-US" sz="2400" dirty="0" smtClean="0"/>
+              <a:t>CI operators</a:t>
+            </a:r>
+            <a:endParaRPr lang="en-US" sz="2400" dirty="0"/>
           </a:p>
           <a:p>
             <a:pPr lvl="1">
@@ -17581,7 +17852,7 @@
               <a:buSzTx/>
             </a:pPr>
             <a:r>
-              <a:rPr lang="en-US" sz="2000">
+              <a:rPr lang="en-US" sz="2000" dirty="0">
                 <a:ea typeface="ＭＳ Ｐゴシック" charset="-128"/>
               </a:rPr>
               <a:t>Verify requirements are fulfilled by resource providers </a:t>
@@ -17602,7 +17873,7 @@
               <a:buSzTx/>
             </a:pPr>
             <a:r>
-              <a:rPr lang="en-US" sz="2000">
+              <a:rPr lang="en-US" sz="2000" dirty="0">
                 <a:ea typeface="ＭＳ Ｐゴシック" charset="-128"/>
               </a:rPr>
               <a:t>Identify failure trends</a:t>
@@ -17620,14 +17891,14 @@
               <a:buSzTx/>
             </a:pPr>
             <a:r>
-              <a:rPr lang="en-US" sz="2400"/>
+              <a:rPr lang="en-US" sz="2400" dirty="0"/>
               <a:t>System administrators</a:t>
             </a:r>
           </a:p>
           <a:p>
             <a:pPr lvl="1"/>
             <a:r>
-              <a:rPr lang="en-US" sz="2000">
+              <a:rPr lang="en-US" sz="2000" dirty="0">
                 <a:ea typeface="ＭＳ Ｐゴシック" charset="-128"/>
               </a:rPr>
               <a:t>Email notification</a:t>
@@ -17640,7 +17911,7 @@
               </a:spcAft>
             </a:pPr>
             <a:r>
-              <a:rPr lang="en-US" sz="2000">
+              <a:rPr lang="en-US" sz="2000" dirty="0">
                 <a:ea typeface="ＭＳ Ｐゴシック" charset="-128"/>
               </a:rPr>
               <a:t>Debugging support</a:t>
@@ -17648,14 +17919,14 @@
           </a:p>
           <a:p>
             <a:r>
-              <a:rPr lang="en-US" sz="2400"/>
+              <a:rPr lang="en-US" sz="2400" dirty="0"/>
               <a:t>End users</a:t>
             </a:r>
           </a:p>
           <a:p>
             <a:pPr lvl="1"/>
             <a:r>
-              <a:rPr lang="en-US" sz="2000">
+              <a:rPr lang="en-US" sz="2000" dirty="0">
                 <a:ea typeface="ＭＳ Ｐゴシック" charset="-128"/>
               </a:rPr>
               <a:t>Debug user account/environment issues </a:t>
@@ -17664,11 +17935,20 @@
           <a:p>
             <a:pPr lvl="1"/>
             <a:r>
-              <a:rPr lang="en-US" sz="2000">
+              <a:rPr lang="en-US" sz="2000" dirty="0">
                 <a:ea typeface="ＭＳ Ｐゴシック" charset="-128"/>
               </a:rPr>
-              <a:t>Advanced users: feedback to Grid/VO</a:t>
-            </a:r>
+              <a:t>Advanced users: feedback to</a:t>
+            </a:r>
+            <a:r>
+              <a:rPr lang="en-US" sz="2000" dirty="0" smtClean="0">
+                <a:ea typeface="ＭＳ Ｐゴシック" charset="-128"/>
+              </a:rPr>
+              <a:t> CI managers</a:t>
+            </a:r>
+            <a:endParaRPr lang="en-US" sz="2000" dirty="0">
+              <a:ea typeface="ＭＳ Ｐゴシック" charset="-128"/>
+            </a:endParaRPr>
           </a:p>
         </p:txBody>
       </p:sp>

</xml_diff>